<commit_message>
Update Word Bullet list etc,.
</commit_message>
<xml_diff>
--- a/Powerpoint.pptx
+++ b/Powerpoint.pptx
@@ -4,15 +4,19 @@
   <p:sldMasterIdLst>
     <p:sldMasterId id="2147483648" r:id="rId1"/>
   </p:sldMasterIdLst>
+  <p:notesMasterIdLst>
+    <p:notesMasterId r:id="rId3"/>
+  </p:notesMasterIdLst>
   <p:sldIdLst>
-    <p:sldId id="256" r:id="rId6"/>
-    <p:sldId id="257" r:id="rId7"/>
-    <p:sldId id="258" r:id="rId8"/>
-    <p:sldId id="259" r:id="rId9"/>
-    <p:sldId id="260" r:id="rId10"/>
-    <p:sldId id="261" r:id="rId11"/>
-    <p:sldId id="262" r:id="rId12"/>
-    <p:sldId id="263" r:id="rId13"/>
+    <p:sldId id="256" r:id="rId2"/>
+    <p:sldId id="257" r:id="rId8"/>
+    <p:sldId id="258" r:id="rId9"/>
+    <p:sldId id="259" r:id="rId10"/>
+    <p:sldId id="260" r:id="rId11"/>
+    <p:sldId id="261" r:id="rId12"/>
+    <p:sldId id="262" r:id="rId13"/>
+    <p:sldId id="263" r:id="rId14"/>
+    <p:sldId id="264" r:id="rId15"/>
   </p:sldIdLst>
   <p:sldSz cx="9144000" cy="6858000" type="screen4x3"/>
   <p:notesSz cx="6858000" cy="9144000"/>
@@ -130,6 +134,439 @@
 </p:presentation>
 </file>
 
+<file path=ppt/notesMasters/notesMaster1.xml><?xml version="1.0" encoding="utf-8"?>
+<p:notesMaster xmlns:a="http://schemas.openxmlformats.org/drawingml/2006/main" xmlns:r="http://schemas.openxmlformats.org/officeDocument/2006/relationships" xmlns:p="http://schemas.openxmlformats.org/presentationml/2006/main">
+  <p:cSld>
+    <p:bg>
+      <p:bgRef idx="1001">
+        <a:schemeClr val="bg1"/>
+      </p:bgRef>
+    </p:bg>
+    <p:spTree>
+      <p:nvGrpSpPr>
+        <p:cNvPr id="1" name=""/>
+        <p:cNvGrpSpPr/>
+        <p:nvPr/>
+      </p:nvGrpSpPr>
+      <p:grpSpPr>
+        <a:xfrm>
+          <a:off x="0" y="0"/>
+          <a:ext cx="0" cy="0"/>
+          <a:chOff x="0" y="0"/>
+          <a:chExt cx="0" cy="0"/>
+        </a:xfrm>
+      </p:grpSpPr>
+      <p:sp>
+        <p:nvSpPr>
+          <p:cNvPr id="2" name="Kopfzeilenplatzhalter 1"/>
+          <p:cNvSpPr>
+            <a:spLocks noGrp="1"/>
+          </p:cNvSpPr>
+          <p:nvPr>
+            <p:ph type="hdr" sz="quarter"/>
+          </p:nvPr>
+        </p:nvSpPr>
+        <p:spPr>
+          <a:xfrm>
+            <a:off x="0" y="0"/>
+            <a:ext cx="2971800" cy="458788"/>
+          </a:xfrm>
+          <a:prstGeom prst="rect">
+            <a:avLst/>
+          </a:prstGeom>
+        </p:spPr>
+        <p:txBody>
+          <a:bodyPr vert="horz" lIns="91440" tIns="45720" rIns="91440" bIns="45720" rtlCol="0"/>
+          <a:lstStyle>
+            <a:lvl1pPr algn="l">
+              <a:defRPr sz="1200"/>
+            </a:lvl1pPr>
+          </a:lstStyle>
+          <a:p>
+            <a:endParaRPr lang="de-DE"/>
+          </a:p>
+        </p:txBody>
+      </p:sp>
+      <p:sp>
+        <p:nvSpPr>
+          <p:cNvPr id="3" name="Datumsplatzhalter 2"/>
+          <p:cNvSpPr>
+            <a:spLocks noGrp="1"/>
+          </p:cNvSpPr>
+          <p:nvPr>
+            <p:ph type="dt" idx="1"/>
+          </p:nvPr>
+        </p:nvSpPr>
+        <p:spPr>
+          <a:xfrm>
+            <a:off x="3884613" y="0"/>
+            <a:ext cx="2971800" cy="458788"/>
+          </a:xfrm>
+          <a:prstGeom prst="rect">
+            <a:avLst/>
+          </a:prstGeom>
+        </p:spPr>
+        <p:txBody>
+          <a:bodyPr vert="horz" lIns="91440" tIns="45720" rIns="91440" bIns="45720" rtlCol="0"/>
+          <a:lstStyle>
+            <a:lvl1pPr algn="r">
+              <a:defRPr sz="1200"/>
+            </a:lvl1pPr>
+          </a:lstStyle>
+          <a:p>
+            <a:fld id="{EB6795BE-DA13-4F40-B51D-F6BF51405F65}" type="datetimeFigureOut">
+              <a:rPr lang="de-DE" smtClean="0"/>
+              <a:t>09.02.2022</a:t>
+            </a:fld>
+            <a:endParaRPr lang="de-DE"/>
+          </a:p>
+        </p:txBody>
+      </p:sp>
+      <p:sp>
+        <p:nvSpPr>
+          <p:cNvPr id="4" name="Folienbildplatzhalter 3"/>
+          <p:cNvSpPr>
+            <a:spLocks noGrp="1" noRot="1" noChangeAspect="1"/>
+          </p:cNvSpPr>
+          <p:nvPr>
+            <p:ph type="sldImg" idx="2"/>
+          </p:nvPr>
+        </p:nvSpPr>
+        <p:spPr>
+          <a:xfrm>
+            <a:off x="1371600" y="1143000"/>
+            <a:ext cx="4114800" cy="3086100"/>
+          </a:xfrm>
+          <a:prstGeom prst="rect">
+            <a:avLst/>
+          </a:prstGeom>
+          <a:noFill/>
+          <a:ln w="12700">
+            <a:solidFill>
+              <a:prstClr val="black"/>
+            </a:solidFill>
+          </a:ln>
+        </p:spPr>
+        <p:txBody>
+          <a:bodyPr vert="horz" lIns="91440" tIns="45720" rIns="91440" bIns="45720" rtlCol="0" anchor="ctr"/>
+          <a:lstStyle/>
+          <a:p>
+            <a:endParaRPr lang="de-DE"/>
+          </a:p>
+        </p:txBody>
+      </p:sp>
+      <p:sp>
+        <p:nvSpPr>
+          <p:cNvPr id="5" name="Notizenplatzhalter 4"/>
+          <p:cNvSpPr>
+            <a:spLocks noGrp="1"/>
+          </p:cNvSpPr>
+          <p:nvPr>
+            <p:ph type="body" sz="quarter" idx="3"/>
+          </p:nvPr>
+        </p:nvSpPr>
+        <p:spPr>
+          <a:xfrm>
+            <a:off x="685800" y="4400550"/>
+            <a:ext cx="5486400" cy="3600450"/>
+          </a:xfrm>
+          <a:prstGeom prst="rect">
+            <a:avLst/>
+          </a:prstGeom>
+        </p:spPr>
+        <p:txBody>
+          <a:bodyPr vert="horz" lIns="91440" tIns="45720" rIns="91440" bIns="45720" rtlCol="0"/>
+          <a:lstStyle/>
+          <a:p>
+            <a:pPr lvl="0"/>
+            <a:r>
+              <a:rPr lang="de-DE"/>
+              <a:t>Mastertextformat bearbeiten</a:t>
+            </a:r>
+          </a:p>
+          <a:p>
+            <a:pPr lvl="1"/>
+            <a:r>
+              <a:rPr lang="de-DE"/>
+              <a:t>Zweite Ebene</a:t>
+            </a:r>
+          </a:p>
+          <a:p>
+            <a:pPr lvl="2"/>
+            <a:r>
+              <a:rPr lang="de-DE"/>
+              <a:t>Dritte Ebene</a:t>
+            </a:r>
+          </a:p>
+          <a:p>
+            <a:pPr lvl="3"/>
+            <a:r>
+              <a:rPr lang="de-DE"/>
+              <a:t>Vierte Ebene</a:t>
+            </a:r>
+          </a:p>
+          <a:p>
+            <a:pPr lvl="4"/>
+            <a:r>
+              <a:rPr lang="de-DE"/>
+              <a:t>Fünfte Ebene</a:t>
+            </a:r>
+          </a:p>
+        </p:txBody>
+      </p:sp>
+      <p:sp>
+        <p:nvSpPr>
+          <p:cNvPr id="6" name="Fußzeilenplatzhalter 5"/>
+          <p:cNvSpPr>
+            <a:spLocks noGrp="1"/>
+          </p:cNvSpPr>
+          <p:nvPr>
+            <p:ph type="ftr" sz="quarter" idx="4"/>
+          </p:nvPr>
+        </p:nvSpPr>
+        <p:spPr>
+          <a:xfrm>
+            <a:off x="0" y="8685213"/>
+            <a:ext cx="2971800" cy="458787"/>
+          </a:xfrm>
+          <a:prstGeom prst="rect">
+            <a:avLst/>
+          </a:prstGeom>
+        </p:spPr>
+        <p:txBody>
+          <a:bodyPr vert="horz" lIns="91440" tIns="45720" rIns="91440" bIns="45720" rtlCol="0" anchor="b"/>
+          <a:lstStyle>
+            <a:lvl1pPr algn="l">
+              <a:defRPr sz="1200"/>
+            </a:lvl1pPr>
+          </a:lstStyle>
+          <a:p>
+            <a:endParaRPr lang="de-DE"/>
+          </a:p>
+        </p:txBody>
+      </p:sp>
+      <p:sp>
+        <p:nvSpPr>
+          <p:cNvPr id="7" name="Foliennummernplatzhalter 6"/>
+          <p:cNvSpPr>
+            <a:spLocks noGrp="1"/>
+          </p:cNvSpPr>
+          <p:nvPr>
+            <p:ph type="sldNum" sz="quarter" idx="5"/>
+          </p:nvPr>
+        </p:nvSpPr>
+        <p:spPr>
+          <a:xfrm>
+            <a:off x="3884613" y="8685213"/>
+            <a:ext cx="2971800" cy="458787"/>
+          </a:xfrm>
+          <a:prstGeom prst="rect">
+            <a:avLst/>
+          </a:prstGeom>
+        </p:spPr>
+        <p:txBody>
+          <a:bodyPr vert="horz" lIns="91440" tIns="45720" rIns="91440" bIns="45720" rtlCol="0" anchor="b"/>
+          <a:lstStyle>
+            <a:lvl1pPr algn="r">
+              <a:defRPr sz="1200"/>
+            </a:lvl1pPr>
+          </a:lstStyle>
+          <a:p>
+            <a:fld id="{883E0F60-6785-4F5F-9D99-B7707A3DEE5A}" type="slidenum">
+              <a:rPr lang="de-DE" smtClean="0"/>
+              <a:t>‹Nr.›</a:t>
+            </a:fld>
+            <a:endParaRPr lang="de-DE"/>
+          </a:p>
+        </p:txBody>
+      </p:sp>
+    </p:spTree>
+    <p:extLst>
+      <p:ext uri="{BB962C8B-B14F-4D97-AF65-F5344CB8AC3E}">
+        <p14:creationId xmlns:p14="http://schemas.microsoft.com/office/powerpoint/2010/main" val="1569417199"/>
+      </p:ext>
+    </p:extLst>
+  </p:cSld>
+  <p:clrMap bg1="lt1" tx1="dk1" bg2="lt2" tx2="dk2" accent1="accent1" accent2="accent2" accent3="accent3" accent4="accent4" accent5="accent5" accent6="accent6" hlink="hlink" folHlink="folHlink"/>
+  <p:notesStyle>
+    <a:lvl1pPr marL="0" algn="l" defTabSz="914400" rtl="0" eaLnBrk="1" latinLnBrk="0" hangingPunct="1">
+      <a:defRPr sz="1200" kern="1200">
+        <a:solidFill>
+          <a:schemeClr val="tx1"/>
+        </a:solidFill>
+        <a:latin typeface="+mn-lt"/>
+        <a:ea typeface="+mn-ea"/>
+        <a:cs typeface="+mn-cs"/>
+      </a:defRPr>
+    </a:lvl1pPr>
+    <a:lvl2pPr marL="457200" algn="l" defTabSz="914400" rtl="0" eaLnBrk="1" latinLnBrk="0" hangingPunct="1">
+      <a:defRPr sz="1200" kern="1200">
+        <a:solidFill>
+          <a:schemeClr val="tx1"/>
+        </a:solidFill>
+        <a:latin typeface="+mn-lt"/>
+        <a:ea typeface="+mn-ea"/>
+        <a:cs typeface="+mn-cs"/>
+      </a:defRPr>
+    </a:lvl2pPr>
+    <a:lvl3pPr marL="914400" algn="l" defTabSz="914400" rtl="0" eaLnBrk="1" latinLnBrk="0" hangingPunct="1">
+      <a:defRPr sz="1200" kern="1200">
+        <a:solidFill>
+          <a:schemeClr val="tx1"/>
+        </a:solidFill>
+        <a:latin typeface="+mn-lt"/>
+        <a:ea typeface="+mn-ea"/>
+        <a:cs typeface="+mn-cs"/>
+      </a:defRPr>
+    </a:lvl3pPr>
+    <a:lvl4pPr marL="1371600" algn="l" defTabSz="914400" rtl="0" eaLnBrk="1" latinLnBrk="0" hangingPunct="1">
+      <a:defRPr sz="1200" kern="1200">
+        <a:solidFill>
+          <a:schemeClr val="tx1"/>
+        </a:solidFill>
+        <a:latin typeface="+mn-lt"/>
+        <a:ea typeface="+mn-ea"/>
+        <a:cs typeface="+mn-cs"/>
+      </a:defRPr>
+    </a:lvl4pPr>
+    <a:lvl5pPr marL="1828800" algn="l" defTabSz="914400" rtl="0" eaLnBrk="1" latinLnBrk="0" hangingPunct="1">
+      <a:defRPr sz="1200" kern="1200">
+        <a:solidFill>
+          <a:schemeClr val="tx1"/>
+        </a:solidFill>
+        <a:latin typeface="+mn-lt"/>
+        <a:ea typeface="+mn-ea"/>
+        <a:cs typeface="+mn-cs"/>
+      </a:defRPr>
+    </a:lvl5pPr>
+    <a:lvl6pPr marL="2286000" algn="l" defTabSz="914400" rtl="0" eaLnBrk="1" latinLnBrk="0" hangingPunct="1">
+      <a:defRPr sz="1200" kern="1200">
+        <a:solidFill>
+          <a:schemeClr val="tx1"/>
+        </a:solidFill>
+        <a:latin typeface="+mn-lt"/>
+        <a:ea typeface="+mn-ea"/>
+        <a:cs typeface="+mn-cs"/>
+      </a:defRPr>
+    </a:lvl6pPr>
+    <a:lvl7pPr marL="2743200" algn="l" defTabSz="914400" rtl="0" eaLnBrk="1" latinLnBrk="0" hangingPunct="1">
+      <a:defRPr sz="1200" kern="1200">
+        <a:solidFill>
+          <a:schemeClr val="tx1"/>
+        </a:solidFill>
+        <a:latin typeface="+mn-lt"/>
+        <a:ea typeface="+mn-ea"/>
+        <a:cs typeface="+mn-cs"/>
+      </a:defRPr>
+    </a:lvl7pPr>
+    <a:lvl8pPr marL="3200400" algn="l" defTabSz="914400" rtl="0" eaLnBrk="1" latinLnBrk="0" hangingPunct="1">
+      <a:defRPr sz="1200" kern="1200">
+        <a:solidFill>
+          <a:schemeClr val="tx1"/>
+        </a:solidFill>
+        <a:latin typeface="+mn-lt"/>
+        <a:ea typeface="+mn-ea"/>
+        <a:cs typeface="+mn-cs"/>
+      </a:defRPr>
+    </a:lvl8pPr>
+    <a:lvl9pPr marL="3657600" algn="l" defTabSz="914400" rtl="0" eaLnBrk="1" latinLnBrk="0" hangingPunct="1">
+      <a:defRPr sz="1200" kern="1200">
+        <a:solidFill>
+          <a:schemeClr val="tx1"/>
+        </a:solidFill>
+        <a:latin typeface="+mn-lt"/>
+        <a:ea typeface="+mn-ea"/>
+        <a:cs typeface="+mn-cs"/>
+      </a:defRPr>
+    </a:lvl9pPr>
+  </p:notesStyle>
+</p:notesMaster>
+</file>
+
+<file path=ppt/notesSlides/notesSlide1.xml><?xml version="1.0" encoding="utf-8"?>
+<p:notes xmlns:a="http://schemas.openxmlformats.org/drawingml/2006/main" xmlns:r="http://schemas.openxmlformats.org/officeDocument/2006/relationships" xmlns:p="http://schemas.openxmlformats.org/presentationml/2006/main">
+  <p:cSld>
+    <p:spTree>
+      <p:nvGrpSpPr>
+        <p:cNvPr id="1" name=""/>
+        <p:cNvGrpSpPr/>
+        <p:nvPr/>
+      </p:nvGrpSpPr>
+      <p:grpSpPr>
+        <a:xfrm>
+          <a:off x="0" y="0"/>
+          <a:ext cx="0" cy="0"/>
+          <a:chOff x="0" y="0"/>
+          <a:chExt cx="0" cy="0"/>
+        </a:xfrm>
+      </p:grpSpPr>
+      <p:sp>
+        <p:nvSpPr>
+          <p:cNvPr id="2" name="Folienbildplatzhalter 1"/>
+          <p:cNvSpPr>
+            <a:spLocks noGrp="1" noRot="1" noChangeAspect="1"/>
+          </p:cNvSpPr>
+          <p:nvPr>
+            <p:ph type="sldImg"/>
+          </p:nvPr>
+        </p:nvSpPr>
+        <p:spPr/>
+      </p:sp>
+      <p:sp>
+        <p:nvSpPr>
+          <p:cNvPr id="3" name="Notizenplatzhalter 2"/>
+          <p:cNvSpPr>
+            <a:spLocks noGrp="1"/>
+          </p:cNvSpPr>
+          <p:nvPr>
+            <p:ph type="body" idx="1"/>
+          </p:nvPr>
+        </p:nvSpPr>
+        <p:spPr/>
+        <p:txBody>
+          <a:bodyPr/>
+          <a:lstStyle/>
+          <a:p>
+            <a:endParaRPr lang="de-DE" dirty="0"/>
+          </a:p>
+        </p:txBody>
+      </p:sp>
+      <p:sp>
+        <p:nvSpPr>
+          <p:cNvPr id="4" name="Foliennummernplatzhalter 3"/>
+          <p:cNvSpPr>
+            <a:spLocks noGrp="1"/>
+          </p:cNvSpPr>
+          <p:nvPr>
+            <p:ph type="sldNum" sz="quarter" idx="5"/>
+          </p:nvPr>
+        </p:nvSpPr>
+        <p:spPr/>
+        <p:txBody>
+          <a:bodyPr/>
+          <a:lstStyle/>
+          <a:p>
+            <a:fld id="{883E0F60-6785-4F5F-9D99-B7707A3DEE5A}" type="slidenum">
+              <a:rPr lang="de-DE" smtClean="0"/>
+              <a:t>1</a:t>
+            </a:fld>
+            <a:endParaRPr lang="de-DE"/>
+          </a:p>
+        </p:txBody>
+      </p:sp>
+    </p:spTree>
+    <p:extLst>
+      <p:ext uri="{BB962C8B-B14F-4D97-AF65-F5344CB8AC3E}">
+        <p14:creationId xmlns:p14="http://schemas.microsoft.com/office/powerpoint/2010/main" val="3974851777"/>
+      </p:ext>
+    </p:extLst>
+  </p:cSld>
+  <p:clrMapOvr>
+    <a:masterClrMapping/>
+  </p:clrMapOvr>
+</p:notes>
+</file>
+
 <file path=ppt/slideLayouts/slideLayout1.xml><?xml version="1.0" encoding="utf-8"?>
 <p:sldLayout xmlns:a="http://schemas.openxmlformats.org/drawingml/2006/main" xmlns:r="http://schemas.openxmlformats.org/officeDocument/2006/relationships" xmlns:p="http://schemas.openxmlformats.org/presentationml/2006/main" preserve="1" userDrawn="1">
   <p:cSld name="1_Two Content">
@@ -165,7 +602,12 @@
             <p:ph type="title"/>
           </p:nvPr>
         </p:nvSpPr>
-        <p:spPr/>
+        <p:spPr>
+          <a:xfrm>
+            <a:off x="457200" y="274638"/>
+            <a:ext cx="7687559" cy="1143000"/>
+          </a:xfrm>
+        </p:spPr>
         <p:txBody>
           <a:bodyPr>
             <a:normAutofit/>
@@ -314,7 +756,7 @@
           <a:p>
             <a:fld id="{5BCAD085-E8A6-8845-BD4E-CB4CCA059FC4}" type="datetimeFigureOut">
               <a:rPr lang="en-US" smtClean="0"/>
-              <a:t>2/9/22</a:t>
+              <a:t>2/9/2022</a:t>
             </a:fld>
             <a:endParaRPr lang="en-US"/>
           </a:p>
@@ -800,7 +1242,7 @@
           <a:p>
             <a:fld id="{5BCAD085-E8A6-8845-BD4E-CB4CCA059FC4}" type="datetimeFigureOut">
               <a:rPr lang="en-US" smtClean="0"/>
-              <a:t>2/9/22</a:t>
+              <a:t>2/9/2022</a:t>
             </a:fld>
             <a:endParaRPr lang="en-US"/>
           </a:p>
@@ -917,7 +1359,7 @@
           <a:p>
             <a:fld id="{5BCAD085-E8A6-8845-BD4E-CB4CCA059FC4}" type="datetimeFigureOut">
               <a:rPr lang="en-US" smtClean="0"/>
-              <a:t>2/9/22</a:t>
+              <a:t>2/9/2022</a:t>
             </a:fld>
             <a:endParaRPr lang="en-US"/>
           </a:p>
@@ -1012,7 +1454,7 @@
           <a:p>
             <a:fld id="{5BCAD085-E8A6-8845-BD4E-CB4CCA059FC4}" type="datetimeFigureOut">
               <a:rPr lang="en-US" smtClean="0"/>
-              <a:t>2/9/22</a:t>
+              <a:t>2/9/2022</a:t>
             </a:fld>
             <a:endParaRPr lang="en-US"/>
           </a:p>
@@ -1287,7 +1729,7 @@
           <a:p>
             <a:fld id="{5BCAD085-E8A6-8845-BD4E-CB4CCA059FC4}" type="datetimeFigureOut">
               <a:rPr lang="en-US" smtClean="0"/>
-              <a:t>2/9/22</a:t>
+              <a:t>2/9/2022</a:t>
             </a:fld>
             <a:endParaRPr lang="en-US"/>
           </a:p>
@@ -1539,7 +1981,7 @@
           <a:p>
             <a:fld id="{5BCAD085-E8A6-8845-BD4E-CB4CCA059FC4}" type="datetimeFigureOut">
               <a:rPr lang="en-US" smtClean="0"/>
-              <a:t>2/9/22</a:t>
+              <a:t>2/9/2022</a:t>
             </a:fld>
             <a:endParaRPr lang="en-US"/>
           </a:p>
@@ -1707,7 +2149,7 @@
           <a:p>
             <a:fld id="{5BCAD085-E8A6-8845-BD4E-CB4CCA059FC4}" type="datetimeFigureOut">
               <a:rPr lang="en-US" smtClean="0"/>
-              <a:t>2/9/22</a:t>
+              <a:t>2/9/2022</a:t>
             </a:fld>
             <a:endParaRPr lang="en-US"/>
           </a:p>
@@ -1885,7 +2327,7 @@
           <a:p>
             <a:fld id="{5BCAD085-E8A6-8845-BD4E-CB4CCA059FC4}" type="datetimeFigureOut">
               <a:rPr lang="en-US" smtClean="0"/>
-              <a:t>2/9/22</a:t>
+              <a:t>2/9/2022</a:t>
             </a:fld>
             <a:endParaRPr lang="en-US"/>
           </a:p>
@@ -1981,7 +2423,12 @@
             <p:ph type="title"/>
           </p:nvPr>
         </p:nvSpPr>
-        <p:spPr/>
+        <p:spPr>
+          <a:xfrm>
+            <a:off x="427538" y="274638"/>
+            <a:ext cx="7688940" cy="1143000"/>
+          </a:xfrm>
+        </p:spPr>
         <p:txBody>
           <a:bodyPr>
             <a:normAutofit/>
@@ -2102,7 +2549,7 @@
           <a:p>
             <a:fld id="{5BCAD085-E8A6-8845-BD4E-CB4CCA059FC4}" type="datetimeFigureOut">
               <a:rPr lang="en-US" smtClean="0"/>
-              <a:t>2/9/22</a:t>
+              <a:t>2/9/2022</a:t>
             </a:fld>
             <a:endParaRPr lang="en-US"/>
           </a:p>
@@ -2573,7 +3020,12 @@
             <p:ph type="title"/>
           </p:nvPr>
         </p:nvSpPr>
-        <p:spPr/>
+        <p:spPr>
+          <a:xfrm>
+            <a:off x="457200" y="274638"/>
+            <a:ext cx="7678132" cy="1143000"/>
+          </a:xfrm>
+        </p:spPr>
         <p:txBody>
           <a:bodyPr>
             <a:normAutofit/>
@@ -2722,7 +3174,7 @@
           <a:p>
             <a:fld id="{5BCAD085-E8A6-8845-BD4E-CB4CCA059FC4}" type="datetimeFigureOut">
               <a:rPr lang="en-US" smtClean="0"/>
-              <a:t>2/9/22</a:t>
+              <a:t>2/9/2022</a:t>
             </a:fld>
             <a:endParaRPr lang="en-US"/>
           </a:p>
@@ -3034,7 +3486,7 @@
           <a:p>
             <a:fld id="{5BCAD085-E8A6-8845-BD4E-CB4CCA059FC4}" type="datetimeFigureOut">
               <a:rPr lang="en-US" smtClean="0"/>
-              <a:t>2/9/22</a:t>
+              <a:t>2/9/2022</a:t>
             </a:fld>
             <a:endParaRPr lang="en-US"/>
           </a:p>
@@ -3197,7 +3649,12 @@
             <p:ph type="title"/>
           </p:nvPr>
         </p:nvSpPr>
-        <p:spPr/>
+        <p:spPr>
+          <a:xfrm>
+            <a:off x="457200" y="274638"/>
+            <a:ext cx="7668705" cy="1143000"/>
+          </a:xfrm>
+        </p:spPr>
         <p:txBody>
           <a:bodyPr>
             <a:normAutofit/>
@@ -3346,7 +3803,7 @@
           <a:p>
             <a:fld id="{5BCAD085-E8A6-8845-BD4E-CB4CCA059FC4}" type="datetimeFigureOut">
               <a:rPr lang="en-US" smtClean="0"/>
-              <a:t>2/9/22</a:t>
+              <a:t>2/9/2022</a:t>
             </a:fld>
             <a:endParaRPr lang="en-US"/>
           </a:p>
@@ -3653,7 +4110,7 @@
           <a:p>
             <a:fld id="{5BCAD085-E8A6-8845-BD4E-CB4CCA059FC4}" type="datetimeFigureOut">
               <a:rPr lang="en-US" smtClean="0"/>
-              <a:t>2/9/22</a:t>
+              <a:t>2/9/2022</a:t>
             </a:fld>
             <a:endParaRPr lang="en-US"/>
           </a:p>
@@ -3821,7 +4278,7 @@
           <a:p>
             <a:fld id="{5BCAD085-E8A6-8845-BD4E-CB4CCA059FC4}" type="datetimeFigureOut">
               <a:rPr lang="en-US" smtClean="0"/>
-              <a:t>2/9/22</a:t>
+              <a:t>2/9/2022</a:t>
             </a:fld>
             <a:endParaRPr lang="en-US"/>
           </a:p>
@@ -4066,7 +4523,7 @@
           <a:p>
             <a:fld id="{5BCAD085-E8A6-8845-BD4E-CB4CCA059FC4}" type="datetimeFigureOut">
               <a:rPr lang="en-US" smtClean="0"/>
-              <a:t>2/9/22</a:t>
+              <a:t>2/9/2022</a:t>
             </a:fld>
             <a:endParaRPr lang="en-US"/>
           </a:p>
@@ -4351,7 +4808,7 @@
           <a:p>
             <a:fld id="{5BCAD085-E8A6-8845-BD4E-CB4CCA059FC4}" type="datetimeFigureOut">
               <a:rPr lang="en-US" smtClean="0"/>
-              <a:t>2/9/22</a:t>
+              <a:t>2/9/2022</a:t>
             </a:fld>
             <a:endParaRPr lang="en-US"/>
           </a:p>
@@ -4562,7 +5019,7 @@
           <a:p>
             <a:fld id="{5BCAD085-E8A6-8845-BD4E-CB4CCA059FC4}" type="datetimeFigureOut">
               <a:rPr lang="en-US" smtClean="0"/>
-              <a:t>2/9/22</a:t>
+              <a:t>2/9/2022</a:t>
             </a:fld>
             <a:endParaRPr lang="en-US"/>
           </a:p>
@@ -4646,6 +5103,437 @@
           </a:p>
         </p:txBody>
       </p:sp>
+      <p:sp>
+        <p:nvSpPr>
+          <p:cNvPr id="7" name="Rectangle 51">
+            <a:extLst>
+              <a:ext uri="{FF2B5EF4-FFF2-40B4-BE49-F238E27FC236}">
+                <a16:creationId xmlns:a16="http://schemas.microsoft.com/office/drawing/2014/main" id="{E8C9F1E0-C297-4724-BBAE-51F30A62C758}"/>
+              </a:ext>
+            </a:extLst>
+          </p:cNvPr>
+          <p:cNvSpPr/>
+          <p:nvPr userDrawn="1"/>
+        </p:nvSpPr>
+        <p:spPr>
+          <a:xfrm>
+            <a:off x="-1" y="0"/>
+            <a:ext cx="197963" cy="6858000"/>
+          </a:xfrm>
+          <a:prstGeom prst="rect">
+            <a:avLst/>
+          </a:prstGeom>
+          <a:gradFill flip="none" rotWithShape="1">
+            <a:gsLst>
+              <a:gs pos="0">
+                <a:srgbClr val="C8A9C6">
+                  <a:alpha val="57000"/>
+                </a:srgbClr>
+              </a:gs>
+              <a:gs pos="81000">
+                <a:srgbClr val="276A94"/>
+              </a:gs>
+              <a:gs pos="49000">
+                <a:srgbClr val="4DDBE3">
+                  <a:alpha val="74000"/>
+                </a:srgbClr>
+              </a:gs>
+              <a:gs pos="99000">
+                <a:srgbClr val="072542"/>
+              </a:gs>
+            </a:gsLst>
+            <a:path path="circle">
+              <a:fillToRect r="100000" b="100000"/>
+            </a:path>
+            <a:tileRect l="-100000" t="-100000"/>
+          </a:gradFill>
+          <a:ln>
+            <a:noFill/>
+          </a:ln>
+        </p:spPr>
+        <p:style>
+          <a:lnRef idx="2">
+            <a:schemeClr val="accent1">
+              <a:shade val="50000"/>
+            </a:schemeClr>
+          </a:lnRef>
+          <a:fillRef idx="1">
+            <a:schemeClr val="accent1"/>
+          </a:fillRef>
+          <a:effectRef idx="0">
+            <a:schemeClr val="accent1"/>
+          </a:effectRef>
+          <a:fontRef idx="minor">
+            <a:schemeClr val="lt1"/>
+          </a:fontRef>
+        </p:style>
+        <p:txBody>
+          <a:bodyPr rtlCol="0" anchor="ctr"/>
+          <a:lstStyle/>
+          <a:p>
+            <a:pPr algn="ctr"/>
+            <a:endParaRPr lang="en-US"/>
+          </a:p>
+        </p:txBody>
+      </p:sp>
+      <p:grpSp>
+        <p:nvGrpSpPr>
+          <p:cNvPr id="8" name="Gruppieren 7">
+            <a:extLst>
+              <a:ext uri="{FF2B5EF4-FFF2-40B4-BE49-F238E27FC236}">
+                <a16:creationId xmlns:a16="http://schemas.microsoft.com/office/drawing/2014/main" id="{64F95C47-2259-4362-92BA-945B540FA74F}"/>
+              </a:ext>
+            </a:extLst>
+          </p:cNvPr>
+          <p:cNvGrpSpPr/>
+          <p:nvPr userDrawn="1"/>
+        </p:nvGrpSpPr>
+        <p:grpSpPr>
+          <a:xfrm>
+            <a:off x="8248454" y="90105"/>
+            <a:ext cx="821977" cy="858098"/>
+            <a:chOff x="12324889" y="210143"/>
+            <a:chExt cx="2429355" cy="2330704"/>
+          </a:xfrm>
+        </p:grpSpPr>
+        <p:grpSp>
+          <p:nvGrpSpPr>
+            <p:cNvPr id="9" name="Gruppieren 8">
+              <a:extLst>
+                <a:ext uri="{FF2B5EF4-FFF2-40B4-BE49-F238E27FC236}">
+                  <a16:creationId xmlns:a16="http://schemas.microsoft.com/office/drawing/2014/main" id="{926A26D9-30AB-4433-A716-4ED6B8FF7D94}"/>
+                </a:ext>
+              </a:extLst>
+            </p:cNvPr>
+            <p:cNvGrpSpPr/>
+            <p:nvPr/>
+          </p:nvGrpSpPr>
+          <p:grpSpPr>
+            <a:xfrm>
+              <a:off x="12324889" y="210143"/>
+              <a:ext cx="2429355" cy="2330704"/>
+              <a:chOff x="7853653" y="1375495"/>
+              <a:chExt cx="1703097" cy="1703097"/>
+            </a:xfrm>
+          </p:grpSpPr>
+          <p:pic>
+            <p:nvPicPr>
+              <p:cNvPr id="15" name="Grafik 14" descr="Schildkreuz mit einfarbiger Füllung">
+                <a:extLst>
+                  <a:ext uri="{FF2B5EF4-FFF2-40B4-BE49-F238E27FC236}">
+                    <a16:creationId xmlns:a16="http://schemas.microsoft.com/office/drawing/2014/main" id="{F4B885F8-809E-44FC-815A-630210F7D30F}"/>
+                  </a:ext>
+                </a:extLst>
+              </p:cNvPr>
+              <p:cNvPicPr>
+                <a:picLocks noChangeAspect="1"/>
+              </p:cNvPicPr>
+              <p:nvPr/>
+            </p:nvPicPr>
+            <p:blipFill>
+              <a:blip r:embed="rId18">
+                <a:extLst>
+                  <a:ext uri="{28A0092B-C50C-407E-A947-70E740481C1C}">
+                    <a14:useLocalDpi xmlns:a14="http://schemas.microsoft.com/office/drawing/2010/main" val="0"/>
+                  </a:ext>
+                  <a:ext uri="{96DAC541-7B7A-43D3-8B79-37D633B846F1}">
+                    <asvg:svgBlip xmlns:asvg="http://schemas.microsoft.com/office/drawing/2016/SVG/main" r:embed="rId19"/>
+                  </a:ext>
+                </a:extLst>
+              </a:blip>
+              <a:stretch>
+                <a:fillRect/>
+              </a:stretch>
+            </p:blipFill>
+            <p:spPr>
+              <a:xfrm>
+                <a:off x="7853653" y="1375495"/>
+                <a:ext cx="1703097" cy="1703097"/>
+              </a:xfrm>
+              <a:prstGeom prst="rect">
+                <a:avLst/>
+              </a:prstGeom>
+              <a:effectLst>
+                <a:glow rad="101600">
+                  <a:srgbClr val="4DC0C7">
+                    <a:alpha val="60000"/>
+                  </a:srgbClr>
+                </a:glow>
+              </a:effectLst>
+            </p:spPr>
+          </p:pic>
+          <p:pic>
+            <p:nvPicPr>
+              <p:cNvPr id="16" name="Grafik 15" descr="Schild mit einfarbiger Füllung">
+                <a:extLst>
+                  <a:ext uri="{FF2B5EF4-FFF2-40B4-BE49-F238E27FC236}">
+                    <a16:creationId xmlns:a16="http://schemas.microsoft.com/office/drawing/2014/main" id="{DB9DF485-BF13-4FD7-AF9E-E544D183C777}"/>
+                  </a:ext>
+                </a:extLst>
+              </p:cNvPr>
+              <p:cNvPicPr>
+                <a:picLocks noChangeAspect="1"/>
+              </p:cNvPicPr>
+              <p:nvPr/>
+            </p:nvPicPr>
+            <p:blipFill>
+              <a:blip r:embed="rId20">
+                <a:extLst>
+                  <a:ext uri="{28A0092B-C50C-407E-A947-70E740481C1C}">
+                    <a14:useLocalDpi xmlns:a14="http://schemas.microsoft.com/office/drawing/2010/main" val="0"/>
+                  </a:ext>
+                  <a:ext uri="{96DAC541-7B7A-43D3-8B79-37D633B846F1}">
+                    <asvg:svgBlip xmlns:asvg="http://schemas.microsoft.com/office/drawing/2016/SVG/main" r:embed="rId21"/>
+                  </a:ext>
+                </a:extLst>
+              </a:blip>
+              <a:stretch>
+                <a:fillRect/>
+              </a:stretch>
+            </p:blipFill>
+            <p:spPr>
+              <a:xfrm>
+                <a:off x="8039100" y="1618274"/>
+                <a:ext cx="1333499" cy="1232875"/>
+              </a:xfrm>
+              <a:prstGeom prst="rect">
+                <a:avLst/>
+              </a:prstGeom>
+              <a:effectLst>
+                <a:glow rad="101600">
+                  <a:srgbClr val="4DC0C7">
+                    <a:alpha val="60000"/>
+                  </a:srgbClr>
+                </a:glow>
+              </a:effectLst>
+            </p:spPr>
+          </p:pic>
+        </p:grpSp>
+        <p:grpSp>
+          <p:nvGrpSpPr>
+            <p:cNvPr id="10" name="Gruppieren 9">
+              <a:extLst>
+                <a:ext uri="{FF2B5EF4-FFF2-40B4-BE49-F238E27FC236}">
+                  <a16:creationId xmlns:a16="http://schemas.microsoft.com/office/drawing/2014/main" id="{9F673E6F-1372-4485-A5D3-66C78B41A84C}"/>
+                </a:ext>
+              </a:extLst>
+            </p:cNvPr>
+            <p:cNvGrpSpPr/>
+            <p:nvPr/>
+          </p:nvGrpSpPr>
+          <p:grpSpPr>
+            <a:xfrm>
+              <a:off x="13052014" y="907464"/>
+              <a:ext cx="973019" cy="936060"/>
+              <a:chOff x="5685905" y="1633614"/>
+              <a:chExt cx="682134" cy="684000"/>
+            </a:xfrm>
+          </p:grpSpPr>
+          <p:sp>
+            <p:nvSpPr>
+              <p:cNvPr id="11" name="Flussdiagramm: Verbinder 10">
+                <a:extLst>
+                  <a:ext uri="{FF2B5EF4-FFF2-40B4-BE49-F238E27FC236}">
+                    <a16:creationId xmlns:a16="http://schemas.microsoft.com/office/drawing/2014/main" id="{78F81C11-3E16-416A-86FB-C35655089AFC}"/>
+                  </a:ext>
+                </a:extLst>
+              </p:cNvPr>
+              <p:cNvSpPr/>
+              <p:nvPr/>
+            </p:nvSpPr>
+            <p:spPr>
+              <a:xfrm>
+                <a:off x="5685905" y="1633614"/>
+                <a:ext cx="682134" cy="684000"/>
+              </a:xfrm>
+              <a:prstGeom prst="flowChartConnector">
+                <a:avLst/>
+              </a:prstGeom>
+              <a:noFill/>
+              <a:ln w="28575" cap="flat" cmpd="sng" algn="ctr">
+                <a:solidFill>
+                  <a:srgbClr val="000000"/>
+                </a:solidFill>
+                <a:prstDash val="solid"/>
+                <a:miter lim="800000"/>
+              </a:ln>
+              <a:effectLst/>
+            </p:spPr>
+            <p:txBody>
+              <a:bodyPr rtlCol="0" anchor="ctr"/>
+              <a:lstStyle/>
+              <a:p>
+                <a:pPr marL="0" marR="0" lvl="0" indent="0" algn="ctr" defTabSz="914400" eaLnBrk="1" fontAlgn="auto" latinLnBrk="0" hangingPunct="1">
+                  <a:lnSpc>
+                    <a:spcPct val="100000"/>
+                  </a:lnSpc>
+                  <a:spcBef>
+                    <a:spcPts val="0"/>
+                  </a:spcBef>
+                  <a:spcAft>
+                    <a:spcPts val="0"/>
+                  </a:spcAft>
+                  <a:buClrTx/>
+                  <a:buSzTx/>
+                  <a:buFontTx/>
+                  <a:buNone/>
+                  <a:tabLst/>
+                  <a:defRPr/>
+                </a:pPr>
+                <a:endParaRPr kumimoji="0" lang="de-DE" sz="1800" b="0" i="0" u="none" strike="noStrike" kern="0" cap="none" spc="0" normalizeH="0" baseline="0" noProof="0">
+                  <a:ln>
+                    <a:noFill/>
+                  </a:ln>
+                  <a:solidFill>
+                    <a:srgbClr val="FFFFFF"/>
+                  </a:solidFill>
+                  <a:effectLst/>
+                  <a:uLnTx/>
+                  <a:uFillTx/>
+                  <a:latin typeface="Neue Haas Grotesk Text Pro"/>
+                  <a:ea typeface="+mn-ea"/>
+                  <a:cs typeface="+mn-cs"/>
+                </a:endParaRPr>
+              </a:p>
+            </p:txBody>
+          </p:sp>
+          <p:sp>
+            <p:nvSpPr>
+              <p:cNvPr id="12" name="Gleichschenkliges Dreieck 11">
+                <a:extLst>
+                  <a:ext uri="{FF2B5EF4-FFF2-40B4-BE49-F238E27FC236}">
+                    <a16:creationId xmlns:a16="http://schemas.microsoft.com/office/drawing/2014/main" id="{00748FCB-B7BB-47A9-9AA6-58D42122CDE9}"/>
+                  </a:ext>
+                </a:extLst>
+              </p:cNvPr>
+              <p:cNvSpPr/>
+              <p:nvPr/>
+            </p:nvSpPr>
+            <p:spPr>
+              <a:xfrm>
+                <a:off x="5788847" y="1659609"/>
+                <a:ext cx="476250" cy="543075"/>
+              </a:xfrm>
+              <a:prstGeom prst="triangle">
+                <a:avLst/>
+              </a:prstGeom>
+              <a:noFill/>
+              <a:ln w="28575" cap="flat" cmpd="sng" algn="ctr">
+                <a:solidFill>
+                  <a:srgbClr val="000000"/>
+                </a:solidFill>
+                <a:prstDash val="solid"/>
+                <a:miter lim="800000"/>
+              </a:ln>
+              <a:effectLst/>
+            </p:spPr>
+            <p:txBody>
+              <a:bodyPr rtlCol="0" anchor="ctr"/>
+              <a:lstStyle/>
+              <a:p>
+                <a:pPr marL="0" marR="0" lvl="0" indent="0" algn="ctr" defTabSz="914400" eaLnBrk="1" fontAlgn="auto" latinLnBrk="0" hangingPunct="1">
+                  <a:lnSpc>
+                    <a:spcPct val="100000"/>
+                  </a:lnSpc>
+                  <a:spcBef>
+                    <a:spcPts val="0"/>
+                  </a:spcBef>
+                  <a:spcAft>
+                    <a:spcPts val="0"/>
+                  </a:spcAft>
+                  <a:buClrTx/>
+                  <a:buSzTx/>
+                  <a:buFontTx/>
+                  <a:buNone/>
+                  <a:tabLst/>
+                  <a:defRPr/>
+                </a:pPr>
+                <a:endParaRPr kumimoji="0" lang="de-DE" sz="1800" b="0" i="0" u="none" strike="noStrike" kern="0" cap="none" spc="0" normalizeH="0" baseline="0" noProof="0">
+                  <a:ln>
+                    <a:noFill/>
+                  </a:ln>
+                  <a:solidFill>
+                    <a:srgbClr val="FFFFFF"/>
+                  </a:solidFill>
+                  <a:effectLst/>
+                  <a:uLnTx/>
+                  <a:uFillTx/>
+                  <a:latin typeface="Neue Haas Grotesk Text Pro"/>
+                  <a:ea typeface="+mn-ea"/>
+                  <a:cs typeface="+mn-cs"/>
+                </a:endParaRPr>
+              </a:p>
+            </p:txBody>
+          </p:sp>
+          <p:cxnSp>
+            <p:nvCxnSpPr>
+              <p:cNvPr id="13" name="Gerader Verbinder 12">
+                <a:extLst>
+                  <a:ext uri="{FF2B5EF4-FFF2-40B4-BE49-F238E27FC236}">
+                    <a16:creationId xmlns:a16="http://schemas.microsoft.com/office/drawing/2014/main" id="{5399052E-4416-4E38-8351-4C4C7FACDBDF}"/>
+                  </a:ext>
+                </a:extLst>
+              </p:cNvPr>
+              <p:cNvCxnSpPr>
+                <a:stCxn id="12" idx="1"/>
+                <a:endCxn id="12" idx="5"/>
+              </p:cNvCxnSpPr>
+              <p:nvPr/>
+            </p:nvCxnSpPr>
+            <p:spPr>
+              <a:xfrm>
+                <a:off x="5907910" y="1931147"/>
+                <a:ext cx="238125" cy="0"/>
+              </a:xfrm>
+              <a:prstGeom prst="line">
+                <a:avLst/>
+              </a:prstGeom>
+              <a:noFill/>
+              <a:ln w="28575" cap="flat" cmpd="sng" algn="ctr">
+                <a:solidFill>
+                  <a:srgbClr val="000000"/>
+                </a:solidFill>
+                <a:prstDash val="solid"/>
+                <a:miter lim="800000"/>
+              </a:ln>
+              <a:effectLst/>
+            </p:spPr>
+          </p:cxnSp>
+          <p:cxnSp>
+            <p:nvCxnSpPr>
+              <p:cNvPr id="14" name="Gerader Verbinder 13">
+                <a:extLst>
+                  <a:ext uri="{FF2B5EF4-FFF2-40B4-BE49-F238E27FC236}">
+                    <a16:creationId xmlns:a16="http://schemas.microsoft.com/office/drawing/2014/main" id="{F556A1A1-0DA9-42A5-8930-403B4A6546C4}"/>
+                  </a:ext>
+                </a:extLst>
+              </p:cNvPr>
+              <p:cNvCxnSpPr>
+                <a:endCxn id="12" idx="3"/>
+              </p:cNvCxnSpPr>
+              <p:nvPr/>
+            </p:nvCxnSpPr>
+            <p:spPr>
+              <a:xfrm>
+                <a:off x="6018720" y="1931146"/>
+                <a:ext cx="8252" cy="271538"/>
+              </a:xfrm>
+              <a:prstGeom prst="line">
+                <a:avLst/>
+              </a:prstGeom>
+              <a:noFill/>
+              <a:ln w="28575" cap="flat" cmpd="sng" algn="ctr">
+                <a:solidFill>
+                  <a:srgbClr val="000000"/>
+                </a:solidFill>
+                <a:prstDash val="solid"/>
+                <a:miter lim="800000"/>
+              </a:ln>
+              <a:effectLst/>
+            </p:spPr>
+          </p:cxnSp>
+        </p:grpSp>
+      </p:grpSp>
     </p:spTree>
     <p:extLst>
       <p:ext uri="{BB962C8B-B14F-4D97-AF65-F5344CB8AC3E}">
@@ -4926,7 +5814,7 @@
 </file>
 
 <file path=ppt/slides/slide1.xml><?xml version="1.0" encoding="utf-8"?>
-<p:sld xmlns:a="http://schemas.openxmlformats.org/drawingml/2006/main" xmlns:p="http://schemas.openxmlformats.org/presentationml/2006/main" xmlns:r="http://schemas.openxmlformats.org/officeDocument/2006/relationships">
+<p:sld xmlns:a="http://schemas.openxmlformats.org/drawingml/2006/main" xmlns:r="http://schemas.openxmlformats.org/officeDocument/2006/relationships" xmlns:p="http://schemas.openxmlformats.org/presentationml/2006/main">
   <p:cSld>
     <p:spTree>
       <p:nvGrpSpPr>
@@ -4934,10 +5822,23 @@
         <p:cNvGrpSpPr/>
         <p:nvPr/>
       </p:nvGrpSpPr>
-      <p:grpSpPr/>
-      <p:sp>
-        <p:nvSpPr>
-          <p:cNvPr id="2" name="Title 1"/>
+      <p:grpSpPr>
+        <a:xfrm>
+          <a:off x="0" y="0"/>
+          <a:ext cx="0" cy="0"/>
+          <a:chOff x="0" y="0"/>
+          <a:chExt cx="0" cy="0"/>
+        </a:xfrm>
+      </p:grpSpPr>
+      <p:sp>
+        <p:nvSpPr>
+          <p:cNvPr id="2" name="Titel 1">
+            <a:extLst>
+              <a:ext uri="{FF2B5EF4-FFF2-40B4-BE49-F238E27FC236}">
+                <a16:creationId xmlns:a16="http://schemas.microsoft.com/office/drawing/2014/main" id="{D53E4916-EECA-410C-AB7A-1F500E3B65FF}"/>
+              </a:ext>
+            </a:extLst>
+          </p:cNvPr>
           <p:cNvSpPr>
             <a:spLocks noGrp="1"/>
           </p:cNvSpPr>
@@ -4950,67 +5851,59 @@
           <a:bodyPr/>
           <a:lstStyle/>
           <a:p>
-            <a:r>
-              <a:t>Warum brauch ich das?</a:t>
-            </a:r>
-          </a:p>
-        </p:txBody>
-      </p:sp>
-      <p:sp>
-        <p:nvSpPr>
-          <p:cNvPr id="3" name="Content Placeholder 2"/>
-          <p:cNvSpPr>
-            <a:spLocks noGrp="1"/>
-          </p:cNvSpPr>
-          <p:nvPr>
-            <p:ph idx="2" sz="half"/>
-          </p:nvPr>
-        </p:nvSpPr>
-        <p:spPr/>
-        <p:txBody>
-          <a:bodyPr/>
-          <a:lstStyle/>
-          <a:p/>
-          <a:p>
-            <a:pPr/>
-            <a:r>
-              <a:t>Kosten die durch Datenlecks entstehen steigen Jahr für Jahr an</a:t>
-            </a:r>
-          </a:p>
-          <a:p>
-            <a:pPr/>
-            <a:r>
-              <a:t>Oft können solche Attacken verhindert werden</a:t>
-            </a:r>
-          </a:p>
-          <a:p>
-            <a:pPr/>
-            <a:r>
-              <a:t>Mehr Daten werden gespeichert -&gt; Mehr Schaden kann dadurch angerichtet werden</a:t>
-            </a:r>
-          </a:p>
-        </p:txBody>
-      </p:sp>
-      <p:pic>
-        <p:nvPicPr>
-          <p:cNvPr id="4" name="Picture Placeholder 3" descr="fig_lineplot_pp.png"/>
-          <p:cNvPicPr>
-            <a:picLocks noGrp="1" noChangeAspect="1"/>
-          </p:cNvPicPr>
+            <a:endParaRPr lang="de-DE"/>
+          </a:p>
+        </p:txBody>
+      </p:sp>
+      <p:sp>
+        <p:nvSpPr>
+          <p:cNvPr id="3" name="Inhaltsplatzhalter 2">
+            <a:extLst>
+              <a:ext uri="{FF2B5EF4-FFF2-40B4-BE49-F238E27FC236}">
+                <a16:creationId xmlns:a16="http://schemas.microsoft.com/office/drawing/2014/main" id="{EA3824E4-089D-4DE7-963C-2AA24F14E88F}"/>
+              </a:ext>
+            </a:extLst>
+          </p:cNvPr>
+          <p:cNvSpPr>
+            <a:spLocks noGrp="1"/>
+          </p:cNvSpPr>
+          <p:nvPr>
+            <p:ph sz="half" idx="2"/>
+          </p:nvPr>
+        </p:nvSpPr>
+        <p:spPr/>
+        <p:txBody>
+          <a:bodyPr/>
+          <a:lstStyle/>
+          <a:p>
+            <a:endParaRPr lang="de-DE"/>
+          </a:p>
+        </p:txBody>
+      </p:sp>
+      <p:sp>
+        <p:nvSpPr>
+          <p:cNvPr id="4" name="Bildplatzhalter 3">
+            <a:extLst>
+              <a:ext uri="{FF2B5EF4-FFF2-40B4-BE49-F238E27FC236}">
+                <a16:creationId xmlns:a16="http://schemas.microsoft.com/office/drawing/2014/main" id="{2CA2C384-C1F7-49FD-832E-9AFDCA5201F0}"/>
+              </a:ext>
+            </a:extLst>
+          </p:cNvPr>
+          <p:cNvSpPr>
+            <a:spLocks noGrp="1"/>
+          </p:cNvSpPr>
           <p:nvPr>
             <p:ph type="pic" idx="1"/>
           </p:nvPr>
-        </p:nvPicPr>
-        <p:blipFill>
-          <a:blip r:embed="rId2"/>
-          <a:srcRect l="0" r="0"/>
-          <a:stretch>
-            <a:fillRect/>
-          </a:stretch>
-        </p:blipFill>
-        <p:spPr/>
-      </p:pic>
+        </p:nvSpPr>
+        <p:spPr/>
+      </p:sp>
     </p:spTree>
+    <p:extLst>
+      <p:ext uri="{BB962C8B-B14F-4D97-AF65-F5344CB8AC3E}">
+        <p14:creationId xmlns:p14="http://schemas.microsoft.com/office/powerpoint/2010/main" val="819584788"/>
+      </p:ext>
+    </p:extLst>
   </p:cSld>
   <p:clrMapOvr>
     <a:masterClrMapping/>
@@ -5044,7 +5937,7 @@
           <a:lstStyle/>
           <a:p>
             <a:r>
-              <a:t>Firmen mit den größten Schäden durch Datenlecks</a:t>
+              <a:t>Warum brauch ich das?</a:t>
             </a:r>
           </a:p>
         </p:txBody>
@@ -5086,7 +5979,7 @@
       </p:sp>
       <p:pic>
         <p:nvPicPr>
-          <p:cNvPr id="4" name="Picture Placeholder 3" descr="fig_bubblechart_pp.png"/>
+          <p:cNvPr id="4" name="Picture Placeholder 3" descr="fig_lineplot_pp.png"/>
           <p:cNvPicPr>
             <a:picLocks noGrp="1" noChangeAspect="1"/>
           </p:cNvPicPr>
@@ -5137,7 +6030,7 @@
           <a:lstStyle/>
           <a:p>
             <a:r>
-              <a:t>Wie greifen Hacker Unternehmen am häufigsten an?</a:t>
+              <a:t>Firmen mit den größten Schäden durch Datenlecks</a:t>
             </a:r>
           </a:p>
         </p:txBody>
@@ -5160,20 +6053,26 @@
           <a:p>
             <a:pPr/>
             <a:r>
-              <a:t>Mensch ist öfter als 50% das Angriffsziel von Hackern</a:t>
+              <a:t>Kosten die durch Datenlecks entstehen steigen Jahr für Jahr an</a:t>
             </a:r>
           </a:p>
           <a:p>
             <a:pPr/>
             <a:r>
-              <a:t>Systembedingt gibt es auch einige Angriffe die aber durch technik verhindert werden können</a:t>
+              <a:t>Oft können solche Attacken verhindert werden</a:t>
+            </a:r>
+          </a:p>
+          <a:p>
+            <a:pPr/>
+            <a:r>
+              <a:t>Mehr Daten werden gespeichert -&gt; Mehr Schaden kann dadurch angerichtet werden</a:t>
             </a:r>
           </a:p>
         </p:txBody>
       </p:sp>
       <p:pic>
         <p:nvPicPr>
-          <p:cNvPr id="4" name="Picture Placeholder 3" descr="treemap_pp.png"/>
+          <p:cNvPr id="4" name="Picture Placeholder 3" descr="fig_bubblechart_pp.png"/>
           <p:cNvPicPr>
             <a:picLocks noGrp="1" noChangeAspect="1"/>
           </p:cNvPicPr>
@@ -5183,7 +6082,7 @@
         </p:nvPicPr>
         <p:blipFill>
           <a:blip r:embed="rId2"/>
-          <a:srcRect l="12" r="12"/>
+          <a:srcRect l="0" r="0"/>
           <a:stretch>
             <a:fillRect/>
           </a:stretch>
@@ -5224,7 +6123,7 @@
           <a:lstStyle/>
           <a:p>
             <a:r>
-              <a:t>Was gibt es für Angriffsarten, die auf den Mensch abzielen?</a:t>
+              <a:t>Wie greifen Hacker Unternehmen am häufigsten an?</a:t>
             </a:r>
           </a:p>
         </p:txBody>
@@ -5247,20 +6146,20 @@
           <a:p>
             <a:pPr/>
             <a:r>
-              <a:t>Die größten Potentiale für Hacker sind die Komprimittierten oder Schwachen Anmeldedaten von Mitarbeitern und das Versenden von Phishing-Mails</a:t>
+              <a:t>Mensch ist öfter als 50% das Angriffsziel von Hackern</a:t>
             </a:r>
           </a:p>
           <a:p>
             <a:pPr/>
             <a:r>
-              <a:t>Die größten Schwachstellen können hierbei im Grunde einfach behoben werden</a:t>
+              <a:t>Systembedingt gibt es auch einige Angriffe die aber durch technik verhindert werden können</a:t>
             </a:r>
           </a:p>
         </p:txBody>
       </p:sp>
       <p:pic>
         <p:nvPicPr>
-          <p:cNvPr id="4" name="Picture Placeholder 3" descr="treemap_mensch_pp.png"/>
+          <p:cNvPr id="4" name="Picture Placeholder 3" descr="treemap_pp.png"/>
           <p:cNvPicPr>
             <a:picLocks noGrp="1" noChangeAspect="1"/>
           </p:cNvPicPr>
@@ -5311,7 +6210,7 @@
           <a:lstStyle/>
           <a:p>
             <a:r>
-              <a:t>Was wollen Phishing Angriffe?</a:t>
+              <a:t>Was gibt es für Angriffsarten, die auf den Mensch abzielen?</a:t>
             </a:r>
           </a:p>
         </p:txBody>
@@ -5332,113 +6231,38 @@
           <a:lstStyle/>
           <a:p/>
           <a:p>
-            <a:r>
-              <a:t>68% der Phishing Mails sollen den Nutzer  dazu Veranlassen einen Link zu öffnen</a:t>
+            <a:pPr/>
+            <a:r>
+              <a:t>Die größten Potentiale für Hacker sind die Komprimittierten oder Schwachen Anmeldedaten von Mitarbeitern und das Versenden von Phishing-Mails</a:t>
+            </a:r>
+          </a:p>
+          <a:p>
+            <a:pPr/>
+            <a:r>
+              <a:t>Die größten Schwachstellen können hierbei im Grunde einfach behoben werden</a:t>
             </a:r>
           </a:p>
         </p:txBody>
       </p:sp>
       <p:pic>
         <p:nvPicPr>
-          <p:cNvPr id="4" name="Picture Placeholder 3" descr="phishing_link_pp.png"/>
+          <p:cNvPr id="4" name="Picture Placeholder 3" descr="treemap_mensch_pp.png"/>
           <p:cNvPicPr>
             <a:picLocks noGrp="1" noChangeAspect="1"/>
           </p:cNvPicPr>
           <p:nvPr>
-            <p:ph type="pic" idx="16"/>
+            <p:ph type="pic" idx="1"/>
           </p:nvPr>
         </p:nvPicPr>
         <p:blipFill>
           <a:blip r:embed="rId2"/>
-          <a:srcRect l="14275" r="14275"/>
+          <a:srcRect l="12" r="12"/>
           <a:stretch>
             <a:fillRect/>
           </a:stretch>
         </p:blipFill>
         <p:spPr/>
       </p:pic>
-      <p:pic>
-        <p:nvPicPr>
-          <p:cNvPr id="5" name="Picture Placeholder 4" descr="phishing_input_pp.png"/>
-          <p:cNvPicPr>
-            <a:picLocks noGrp="1" noChangeAspect="1"/>
-          </p:cNvPicPr>
-          <p:nvPr>
-            <p:ph type="pic" idx="17"/>
-          </p:nvPr>
-        </p:nvPicPr>
-        <p:blipFill>
-          <a:blip r:embed="rId3"/>
-          <a:srcRect l="14275" r="14275"/>
-          <a:stretch>
-            <a:fillRect/>
-          </a:stretch>
-        </p:blipFill>
-        <p:spPr/>
-      </p:pic>
-      <p:pic>
-        <p:nvPicPr>
-          <p:cNvPr id="6" name="Picture Placeholder 5" descr="phishing_attach_pp.png"/>
-          <p:cNvPicPr>
-            <a:picLocks noGrp="1" noChangeAspect="1"/>
-          </p:cNvPicPr>
-          <p:nvPr>
-            <p:ph type="pic" idx="18"/>
-          </p:nvPr>
-        </p:nvPicPr>
-        <p:blipFill>
-          <a:blip r:embed="rId4"/>
-          <a:srcRect l="14275" r="14275"/>
-          <a:stretch>
-            <a:fillRect/>
-          </a:stretch>
-        </p:blipFill>
-        <p:spPr/>
-      </p:pic>
-      <p:sp>
-        <p:nvSpPr>
-          <p:cNvPr id="7" name="Content Placeholder 6"/>
-          <p:cNvSpPr>
-            <a:spLocks noGrp="1"/>
-          </p:cNvSpPr>
-          <p:nvPr>
-            <p:ph idx="19" sz="half"/>
-          </p:nvPr>
-        </p:nvSpPr>
-        <p:spPr/>
-        <p:txBody>
-          <a:bodyPr/>
-          <a:lstStyle/>
-          <a:p/>
-          <a:p>
-            <a:r>
-              <a:t>Bei 23% der Phishing Mails sollen der Nutzer  sensible Daten angeben</a:t>
-            </a:r>
-          </a:p>
-        </p:txBody>
-      </p:sp>
-      <p:sp>
-        <p:nvSpPr>
-          <p:cNvPr id="8" name="Content Placeholder 7"/>
-          <p:cNvSpPr>
-            <a:spLocks noGrp="1"/>
-          </p:cNvSpPr>
-          <p:nvPr>
-            <p:ph idx="20" sz="half"/>
-          </p:nvPr>
-        </p:nvSpPr>
-        <p:spPr/>
-        <p:txBody>
-          <a:bodyPr/>
-          <a:lstStyle/>
-          <a:p/>
-          <a:p>
-            <a:r>
-              <a:t>9% aller Phishing Mails zielen darauf ab, den  Nutzer den Anhang öffnen zu lassen</a:t>
-            </a:r>
-          </a:p>
-        </p:txBody>
-      </p:sp>
     </p:spTree>
   </p:cSld>
   <p:clrMapOvr>
@@ -5473,7 +6297,7 @@
           <a:lstStyle/>
           <a:p>
             <a:r>
-              <a:t>Welche Branchen sind besonders betroffen von Phishing?</a:t>
+              <a:t>Was wollen Phishing Angriffe?</a:t>
             </a:r>
           </a:p>
         </p:txBody>
@@ -5494,38 +6318,113 @@
           <a:lstStyle/>
           <a:p/>
           <a:p>
-            <a:pPr/>
-            <a:r>
-              <a:t>Die größten Potentiale für Hacker sind die Komprimittierten oder Schwachen Anmeldedaten von Mitarbeitern und das Versenden von Phishing-Mails</a:t>
-            </a:r>
-          </a:p>
-          <a:p>
-            <a:pPr/>
-            <a:r>
-              <a:t>Die größten Schwachstellen können hierbei im Grunde einfach behoben werden</a:t>
+            <a:r>
+              <a:t>68% der Phishing Mails sollen den Nutzer  dazu Veranlassen einen Link zu öffnen</a:t>
             </a:r>
           </a:p>
         </p:txBody>
       </p:sp>
       <p:pic>
         <p:nvPicPr>
-          <p:cNvPr id="4" name="Picture Placeholder 3" descr="fail_bar_mark_pp.png"/>
+          <p:cNvPr id="4" name="Picture Placeholder 3" descr="phishing_link_pp.png"/>
           <p:cNvPicPr>
             <a:picLocks noGrp="1" noChangeAspect="1"/>
           </p:cNvPicPr>
           <p:nvPr>
-            <p:ph type="pic" idx="1"/>
+            <p:ph type="pic" idx="16"/>
           </p:nvPr>
         </p:nvPicPr>
         <p:blipFill>
           <a:blip r:embed="rId2"/>
-          <a:srcRect l="1805" r="1805"/>
+          <a:srcRect l="14275" r="14275"/>
           <a:stretch>
             <a:fillRect/>
           </a:stretch>
         </p:blipFill>
         <p:spPr/>
       </p:pic>
+      <p:pic>
+        <p:nvPicPr>
+          <p:cNvPr id="5" name="Picture Placeholder 4" descr="phishing_input_pp.png"/>
+          <p:cNvPicPr>
+            <a:picLocks noGrp="1" noChangeAspect="1"/>
+          </p:cNvPicPr>
+          <p:nvPr>
+            <p:ph type="pic" idx="17"/>
+          </p:nvPr>
+        </p:nvPicPr>
+        <p:blipFill>
+          <a:blip r:embed="rId3"/>
+          <a:srcRect l="14275" r="14275"/>
+          <a:stretch>
+            <a:fillRect/>
+          </a:stretch>
+        </p:blipFill>
+        <p:spPr/>
+      </p:pic>
+      <p:pic>
+        <p:nvPicPr>
+          <p:cNvPr id="6" name="Picture Placeholder 5" descr="phishing_attach_pp.png"/>
+          <p:cNvPicPr>
+            <a:picLocks noGrp="1" noChangeAspect="1"/>
+          </p:cNvPicPr>
+          <p:nvPr>
+            <p:ph type="pic" idx="18"/>
+          </p:nvPr>
+        </p:nvPicPr>
+        <p:blipFill>
+          <a:blip r:embed="rId4"/>
+          <a:srcRect l="14275" r="14275"/>
+          <a:stretch>
+            <a:fillRect/>
+          </a:stretch>
+        </p:blipFill>
+        <p:spPr/>
+      </p:pic>
+      <p:sp>
+        <p:nvSpPr>
+          <p:cNvPr id="7" name="Content Placeholder 6"/>
+          <p:cNvSpPr>
+            <a:spLocks noGrp="1"/>
+          </p:cNvSpPr>
+          <p:nvPr>
+            <p:ph idx="19" sz="half"/>
+          </p:nvPr>
+        </p:nvSpPr>
+        <p:spPr/>
+        <p:txBody>
+          <a:bodyPr/>
+          <a:lstStyle/>
+          <a:p/>
+          <a:p>
+            <a:r>
+              <a:t>Bei 23% der Phishing Mails sollen der Nutzer  sensible Daten angeben</a:t>
+            </a:r>
+          </a:p>
+        </p:txBody>
+      </p:sp>
+      <p:sp>
+        <p:nvSpPr>
+          <p:cNvPr id="8" name="Content Placeholder 7"/>
+          <p:cNvSpPr>
+            <a:spLocks noGrp="1"/>
+          </p:cNvSpPr>
+          <p:nvPr>
+            <p:ph idx="20" sz="half"/>
+          </p:nvPr>
+        </p:nvSpPr>
+        <p:spPr/>
+        <p:txBody>
+          <a:bodyPr/>
+          <a:lstStyle/>
+          <a:p/>
+          <a:p>
+            <a:r>
+              <a:t>9% aller Phishing Mails zielen darauf ab, den  Nutzer den Anhang öffnen zu lassen</a:t>
+            </a:r>
+          </a:p>
+        </p:txBody>
+      </p:sp>
     </p:spTree>
   </p:cSld>
   <p:clrMapOvr>
@@ -5560,7 +6459,7 @@
           <a:lstStyle/>
           <a:p>
             <a:r>
-              <a:t>Welche Abteilungen sind besonders betroffen von Phishing?</a:t>
+              <a:t>Welche Branchen sind besonders betroffen von Phishing?</a:t>
             </a:r>
           </a:p>
         </p:txBody>
@@ -5596,7 +6495,7 @@
       </p:sp>
       <p:pic>
         <p:nvPicPr>
-          <p:cNvPr id="4" name="Picture Placeholder 3" descr="fail_bar_type_name_pp.png"/>
+          <p:cNvPr id="4" name="Picture Placeholder 3" descr="fail_bar_mark_pp.png"/>
           <p:cNvPicPr>
             <a:picLocks noGrp="1" noChangeAspect="1"/>
           </p:cNvPicPr>
@@ -5622,6 +6521,93 @@
 </file>
 
 <file path=ppt/slides/slide8.xml><?xml version="1.0" encoding="utf-8"?>
+<p:sld xmlns:a="http://schemas.openxmlformats.org/drawingml/2006/main" xmlns:p="http://schemas.openxmlformats.org/presentationml/2006/main" xmlns:r="http://schemas.openxmlformats.org/officeDocument/2006/relationships">
+  <p:cSld>
+    <p:spTree>
+      <p:nvGrpSpPr>
+        <p:cNvPr id="1" name=""/>
+        <p:cNvGrpSpPr/>
+        <p:nvPr/>
+      </p:nvGrpSpPr>
+      <p:grpSpPr/>
+      <p:sp>
+        <p:nvSpPr>
+          <p:cNvPr id="2" name="Title 1"/>
+          <p:cNvSpPr>
+            <a:spLocks noGrp="1"/>
+          </p:cNvSpPr>
+          <p:nvPr>
+            <p:ph type="title"/>
+          </p:nvPr>
+        </p:nvSpPr>
+        <p:spPr/>
+        <p:txBody>
+          <a:bodyPr/>
+          <a:lstStyle/>
+          <a:p>
+            <a:r>
+              <a:t>Welche Abteilungen sind besonders betroffen von Phishing?</a:t>
+            </a:r>
+          </a:p>
+        </p:txBody>
+      </p:sp>
+      <p:sp>
+        <p:nvSpPr>
+          <p:cNvPr id="3" name="Content Placeholder 2"/>
+          <p:cNvSpPr>
+            <a:spLocks noGrp="1"/>
+          </p:cNvSpPr>
+          <p:nvPr>
+            <p:ph idx="2" sz="half"/>
+          </p:nvPr>
+        </p:nvSpPr>
+        <p:spPr/>
+        <p:txBody>
+          <a:bodyPr/>
+          <a:lstStyle/>
+          <a:p/>
+          <a:p>
+            <a:pPr/>
+            <a:r>
+              <a:t>Die größten Potentiale für Hacker sind die Komprimittierten oder Schwachen Anmeldedaten von Mitarbeitern und das Versenden von Phishing-Mails</a:t>
+            </a:r>
+          </a:p>
+          <a:p>
+            <a:pPr/>
+            <a:r>
+              <a:t>Die größten Schwachstellen können hierbei im Grunde einfach behoben werden</a:t>
+            </a:r>
+          </a:p>
+        </p:txBody>
+      </p:sp>
+      <p:pic>
+        <p:nvPicPr>
+          <p:cNvPr id="4" name="Picture Placeholder 3" descr="fail_bar_type_name_pp.png"/>
+          <p:cNvPicPr>
+            <a:picLocks noGrp="1" noChangeAspect="1"/>
+          </p:cNvPicPr>
+          <p:nvPr>
+            <p:ph type="pic" idx="1"/>
+          </p:nvPr>
+        </p:nvPicPr>
+        <p:blipFill>
+          <a:blip r:embed="rId2"/>
+          <a:srcRect l="1805" r="1805"/>
+          <a:stretch>
+            <a:fillRect/>
+          </a:stretch>
+        </p:blipFill>
+        <p:spPr/>
+      </p:pic>
+    </p:spTree>
+  </p:cSld>
+  <p:clrMapOvr>
+    <a:masterClrMapping/>
+  </p:clrMapOvr>
+</p:sld>
+</file>
+
+<file path=ppt/slides/slide9.xml><?xml version="1.0" encoding="utf-8"?>
 <p:sld xmlns:a="http://schemas.openxmlformats.org/drawingml/2006/main" xmlns:p="http://schemas.openxmlformats.org/presentationml/2006/main" xmlns:r="http://schemas.openxmlformats.org/officeDocument/2006/relationships">
   <p:cSld>
     <p:spTree>
@@ -6026,4 +7012,299 @@
   </a:objectDefaults>
   <a:extraClrSchemeLst/>
 </a:theme>
+</file>
+
+<file path=ppt/theme/theme2.xml><?xml version="1.0" encoding="utf-8"?>
+<a:theme xmlns:a="http://schemas.openxmlformats.org/drawingml/2006/main" name="Office">
+  <a:themeElements>
+    <a:clrScheme name="Office">
+      <a:dk1>
+        <a:sysClr val="windowText" lastClr="000000"/>
+      </a:dk1>
+      <a:lt1>
+        <a:sysClr val="window" lastClr="FFFFFF"/>
+      </a:lt1>
+      <a:dk2>
+        <a:srgbClr val="44546A"/>
+      </a:dk2>
+      <a:lt2>
+        <a:srgbClr val="E7E6E6"/>
+      </a:lt2>
+      <a:accent1>
+        <a:srgbClr val="4472C4"/>
+      </a:accent1>
+      <a:accent2>
+        <a:srgbClr val="ED7D31"/>
+      </a:accent2>
+      <a:accent3>
+        <a:srgbClr val="A5A5A5"/>
+      </a:accent3>
+      <a:accent4>
+        <a:srgbClr val="FFC000"/>
+      </a:accent4>
+      <a:accent5>
+        <a:srgbClr val="5B9BD5"/>
+      </a:accent5>
+      <a:accent6>
+        <a:srgbClr val="70AD47"/>
+      </a:accent6>
+      <a:hlink>
+        <a:srgbClr val="0563C1"/>
+      </a:hlink>
+      <a:folHlink>
+        <a:srgbClr val="954F72"/>
+      </a:folHlink>
+    </a:clrScheme>
+    <a:fontScheme name="Office">
+      <a:majorFont>
+        <a:latin typeface="Calibri Light" panose="020F0302020204030204"/>
+        <a:ea typeface=""/>
+        <a:cs typeface=""/>
+        <a:font script="Jpan" typeface="游ゴシック Light"/>
+        <a:font script="Hang" typeface="맑은 고딕"/>
+        <a:font script="Hans" typeface="等线 Light"/>
+        <a:font script="Hant" typeface="新細明體"/>
+        <a:font script="Arab" typeface="Times New Roman"/>
+        <a:font script="Hebr" typeface="Times New Roman"/>
+        <a:font script="Thai" typeface="Angsana New"/>
+        <a:font script="Ethi" typeface="Nyala"/>
+        <a:font script="Beng" typeface="Vrinda"/>
+        <a:font script="Gujr" typeface="Shruti"/>
+        <a:font script="Khmr" typeface="MoolBoran"/>
+        <a:font script="Knda" typeface="Tunga"/>
+        <a:font script="Guru" typeface="Raavi"/>
+        <a:font script="Cans" typeface="Euphemia"/>
+        <a:font script="Cher" typeface="Plantagenet Cherokee"/>
+        <a:font script="Yiii" typeface="Microsoft Yi Baiti"/>
+        <a:font script="Tibt" typeface="Microsoft Himalaya"/>
+        <a:font script="Thaa" typeface="MV Boli"/>
+        <a:font script="Deva" typeface="Mangal"/>
+        <a:font script="Telu" typeface="Gautami"/>
+        <a:font script="Taml" typeface="Latha"/>
+        <a:font script="Syrc" typeface="Estrangelo Edessa"/>
+        <a:font script="Orya" typeface="Kalinga"/>
+        <a:font script="Mlym" typeface="Kartika"/>
+        <a:font script="Laoo" typeface="DokChampa"/>
+        <a:font script="Sinh" typeface="Iskoola Pota"/>
+        <a:font script="Mong" typeface="Mongolian Baiti"/>
+        <a:font script="Viet" typeface="Times New Roman"/>
+        <a:font script="Uigh" typeface="Microsoft Uighur"/>
+        <a:font script="Geor" typeface="Sylfaen"/>
+        <a:font script="Armn" typeface="Arial"/>
+        <a:font script="Bugi" typeface="Leelawadee UI"/>
+        <a:font script="Bopo" typeface="Microsoft JhengHei"/>
+        <a:font script="Java" typeface="Javanese Text"/>
+        <a:font script="Lisu" typeface="Segoe UI"/>
+        <a:font script="Mymr" typeface="Myanmar Text"/>
+        <a:font script="Nkoo" typeface="Ebrima"/>
+        <a:font script="Olck" typeface="Nirmala UI"/>
+        <a:font script="Osma" typeface="Ebrima"/>
+        <a:font script="Phag" typeface="Phagspa"/>
+        <a:font script="Syrn" typeface="Estrangelo Edessa"/>
+        <a:font script="Syrj" typeface="Estrangelo Edessa"/>
+        <a:font script="Syre" typeface="Estrangelo Edessa"/>
+        <a:font script="Sora" typeface="Nirmala UI"/>
+        <a:font script="Tale" typeface="Microsoft Tai Le"/>
+        <a:font script="Talu" typeface="Microsoft New Tai Lue"/>
+        <a:font script="Tfng" typeface="Ebrima"/>
+      </a:majorFont>
+      <a:minorFont>
+        <a:latin typeface="Calibri" panose="020F0502020204030204"/>
+        <a:ea typeface=""/>
+        <a:cs typeface=""/>
+        <a:font script="Jpan" typeface="游ゴシック"/>
+        <a:font script="Hang" typeface="맑은 고딕"/>
+        <a:font script="Hans" typeface="等线"/>
+        <a:font script="Hant" typeface="新細明體"/>
+        <a:font script="Arab" typeface="Arial"/>
+        <a:font script="Hebr" typeface="Arial"/>
+        <a:font script="Thai" typeface="Cordia New"/>
+        <a:font script="Ethi" typeface="Nyala"/>
+        <a:font script="Beng" typeface="Vrinda"/>
+        <a:font script="Gujr" typeface="Shruti"/>
+        <a:font script="Khmr" typeface="DaunPenh"/>
+        <a:font script="Knda" typeface="Tunga"/>
+        <a:font script="Guru" typeface="Raavi"/>
+        <a:font script="Cans" typeface="Euphemia"/>
+        <a:font script="Cher" typeface="Plantagenet Cherokee"/>
+        <a:font script="Yiii" typeface="Microsoft Yi Baiti"/>
+        <a:font script="Tibt" typeface="Microsoft Himalaya"/>
+        <a:font script="Thaa" typeface="MV Boli"/>
+        <a:font script="Deva" typeface="Mangal"/>
+        <a:font script="Telu" typeface="Gautami"/>
+        <a:font script="Taml" typeface="Latha"/>
+        <a:font script="Syrc" typeface="Estrangelo Edessa"/>
+        <a:font script="Orya" typeface="Kalinga"/>
+        <a:font script="Mlym" typeface="Kartika"/>
+        <a:font script="Laoo" typeface="DokChampa"/>
+        <a:font script="Sinh" typeface="Iskoola Pota"/>
+        <a:font script="Mong" typeface="Mongolian Baiti"/>
+        <a:font script="Viet" typeface="Arial"/>
+        <a:font script="Uigh" typeface="Microsoft Uighur"/>
+        <a:font script="Geor" typeface="Sylfaen"/>
+        <a:font script="Armn" typeface="Arial"/>
+        <a:font script="Bugi" typeface="Leelawadee UI"/>
+        <a:font script="Bopo" typeface="Microsoft JhengHei"/>
+        <a:font script="Java" typeface="Javanese Text"/>
+        <a:font script="Lisu" typeface="Segoe UI"/>
+        <a:font script="Mymr" typeface="Myanmar Text"/>
+        <a:font script="Nkoo" typeface="Ebrima"/>
+        <a:font script="Olck" typeface="Nirmala UI"/>
+        <a:font script="Osma" typeface="Ebrima"/>
+        <a:font script="Phag" typeface="Phagspa"/>
+        <a:font script="Syrn" typeface="Estrangelo Edessa"/>
+        <a:font script="Syrj" typeface="Estrangelo Edessa"/>
+        <a:font script="Syre" typeface="Estrangelo Edessa"/>
+        <a:font script="Sora" typeface="Nirmala UI"/>
+        <a:font script="Tale" typeface="Microsoft Tai Le"/>
+        <a:font script="Talu" typeface="Microsoft New Tai Lue"/>
+        <a:font script="Tfng" typeface="Ebrima"/>
+      </a:minorFont>
+    </a:fontScheme>
+    <a:fmtScheme name="Office">
+      <a:fillStyleLst>
+        <a:solidFill>
+          <a:schemeClr val="phClr"/>
+        </a:solidFill>
+        <a:gradFill rotWithShape="1">
+          <a:gsLst>
+            <a:gs pos="0">
+              <a:schemeClr val="phClr">
+                <a:lumMod val="110000"/>
+                <a:satMod val="105000"/>
+                <a:tint val="67000"/>
+              </a:schemeClr>
+            </a:gs>
+            <a:gs pos="50000">
+              <a:schemeClr val="phClr">
+                <a:lumMod val="105000"/>
+                <a:satMod val="103000"/>
+                <a:tint val="73000"/>
+              </a:schemeClr>
+            </a:gs>
+            <a:gs pos="100000">
+              <a:schemeClr val="phClr">
+                <a:lumMod val="105000"/>
+                <a:satMod val="109000"/>
+                <a:tint val="81000"/>
+              </a:schemeClr>
+            </a:gs>
+          </a:gsLst>
+          <a:lin ang="5400000" scaled="0"/>
+        </a:gradFill>
+        <a:gradFill rotWithShape="1">
+          <a:gsLst>
+            <a:gs pos="0">
+              <a:schemeClr val="phClr">
+                <a:satMod val="103000"/>
+                <a:lumMod val="102000"/>
+                <a:tint val="94000"/>
+              </a:schemeClr>
+            </a:gs>
+            <a:gs pos="50000">
+              <a:schemeClr val="phClr">
+                <a:satMod val="110000"/>
+                <a:lumMod val="100000"/>
+                <a:shade val="100000"/>
+              </a:schemeClr>
+            </a:gs>
+            <a:gs pos="100000">
+              <a:schemeClr val="phClr">
+                <a:lumMod val="99000"/>
+                <a:satMod val="120000"/>
+                <a:shade val="78000"/>
+              </a:schemeClr>
+            </a:gs>
+          </a:gsLst>
+          <a:lin ang="5400000" scaled="0"/>
+        </a:gradFill>
+      </a:fillStyleLst>
+      <a:lnStyleLst>
+        <a:ln w="6350" cap="flat" cmpd="sng" algn="ctr">
+          <a:solidFill>
+            <a:schemeClr val="phClr"/>
+          </a:solidFill>
+          <a:prstDash val="solid"/>
+          <a:miter lim="800000"/>
+        </a:ln>
+        <a:ln w="12700" cap="flat" cmpd="sng" algn="ctr">
+          <a:solidFill>
+            <a:schemeClr val="phClr"/>
+          </a:solidFill>
+          <a:prstDash val="solid"/>
+          <a:miter lim="800000"/>
+        </a:ln>
+        <a:ln w="19050" cap="flat" cmpd="sng" algn="ctr">
+          <a:solidFill>
+            <a:schemeClr val="phClr"/>
+          </a:solidFill>
+          <a:prstDash val="solid"/>
+          <a:miter lim="800000"/>
+        </a:ln>
+      </a:lnStyleLst>
+      <a:effectStyleLst>
+        <a:effectStyle>
+          <a:effectLst/>
+        </a:effectStyle>
+        <a:effectStyle>
+          <a:effectLst/>
+        </a:effectStyle>
+        <a:effectStyle>
+          <a:effectLst>
+            <a:outerShdw blurRad="57150" dist="19050" dir="5400000" algn="ctr" rotWithShape="0">
+              <a:srgbClr val="000000">
+                <a:alpha val="63000"/>
+              </a:srgbClr>
+            </a:outerShdw>
+          </a:effectLst>
+        </a:effectStyle>
+      </a:effectStyleLst>
+      <a:bgFillStyleLst>
+        <a:solidFill>
+          <a:schemeClr val="phClr"/>
+        </a:solidFill>
+        <a:solidFill>
+          <a:schemeClr val="phClr">
+            <a:tint val="95000"/>
+            <a:satMod val="170000"/>
+          </a:schemeClr>
+        </a:solidFill>
+        <a:gradFill rotWithShape="1">
+          <a:gsLst>
+            <a:gs pos="0">
+              <a:schemeClr val="phClr">
+                <a:tint val="93000"/>
+                <a:satMod val="150000"/>
+                <a:shade val="98000"/>
+                <a:lumMod val="102000"/>
+              </a:schemeClr>
+            </a:gs>
+            <a:gs pos="50000">
+              <a:schemeClr val="phClr">
+                <a:tint val="98000"/>
+                <a:satMod val="130000"/>
+                <a:shade val="90000"/>
+                <a:lumMod val="103000"/>
+              </a:schemeClr>
+            </a:gs>
+            <a:gs pos="100000">
+              <a:schemeClr val="phClr">
+                <a:shade val="63000"/>
+                <a:satMod val="120000"/>
+              </a:schemeClr>
+            </a:gs>
+          </a:gsLst>
+          <a:lin ang="5400000" scaled="0"/>
+        </a:gradFill>
+      </a:bgFillStyleLst>
+    </a:fmtScheme>
+  </a:themeElements>
+  <a:objectDefaults/>
+  <a:extraClrSchemeLst/>
+  <a:extLst>
+    <a:ext uri="{05A4C25C-085E-4340-85A3-A5531E510DB2}">
+      <thm15:themeFamily xmlns:thm15="http://schemas.microsoft.com/office/thememl/2012/main" name="Office Theme" id="{62F939B6-93AF-4DB8-9C6B-D6C7DFDC589F}" vid="{4A3C46E8-61CC-4603-A589-7422A47A8E4A}"/>
+    </a:ext>
+  </a:extLst>
+</a:theme>
 </file>
</xml_diff>